<commit_message>
work on scenes across detectors fig
</commit_message>
<xml_diff>
--- a/paper/graphics/roman_fov.pptx
+++ b/paper/graphics/roman_fov.pptx
@@ -6,6 +6,8 @@
   </p:sldMasterIdLst>
   <p:sldIdLst>
     <p:sldId id="256" r:id="rId2"/>
+    <p:sldId id="257" r:id="rId3"/>
+    <p:sldId id="258" r:id="rId4"/>
   </p:sldIdLst>
   <p:sldSz cx="12192000" cy="6858000"/>
   <p:notesSz cx="6858000" cy="9144000"/>
@@ -259,7 +261,7 @@
           <a:p>
             <a:fld id="{0BABE5B4-7A23-8B46-A908-44B4384204E4}" type="datetimeFigureOut">
               <a:rPr lang="en-US" smtClean="0"/>
-              <a:t>1/3/24</a:t>
+              <a:t>3/18/24</a:t>
             </a:fld>
             <a:endParaRPr lang="en-US"/>
           </a:p>
@@ -457,7 +459,7 @@
           <a:p>
             <a:fld id="{0BABE5B4-7A23-8B46-A908-44B4384204E4}" type="datetimeFigureOut">
               <a:rPr lang="en-US" smtClean="0"/>
-              <a:t>1/3/24</a:t>
+              <a:t>3/18/24</a:t>
             </a:fld>
             <a:endParaRPr lang="en-US"/>
           </a:p>
@@ -665,7 +667,7 @@
           <a:p>
             <a:fld id="{0BABE5B4-7A23-8B46-A908-44B4384204E4}" type="datetimeFigureOut">
               <a:rPr lang="en-US" smtClean="0"/>
-              <a:t>1/3/24</a:t>
+              <a:t>3/18/24</a:t>
             </a:fld>
             <a:endParaRPr lang="en-US"/>
           </a:p>
@@ -863,7 +865,7 @@
           <a:p>
             <a:fld id="{0BABE5B4-7A23-8B46-A908-44B4384204E4}" type="datetimeFigureOut">
               <a:rPr lang="en-US" smtClean="0"/>
-              <a:t>1/3/24</a:t>
+              <a:t>3/18/24</a:t>
             </a:fld>
             <a:endParaRPr lang="en-US"/>
           </a:p>
@@ -1138,7 +1140,7 @@
           <a:p>
             <a:fld id="{0BABE5B4-7A23-8B46-A908-44B4384204E4}" type="datetimeFigureOut">
               <a:rPr lang="en-US" smtClean="0"/>
-              <a:t>1/3/24</a:t>
+              <a:t>3/18/24</a:t>
             </a:fld>
             <a:endParaRPr lang="en-US"/>
           </a:p>
@@ -1403,7 +1405,7 @@
           <a:p>
             <a:fld id="{0BABE5B4-7A23-8B46-A908-44B4384204E4}" type="datetimeFigureOut">
               <a:rPr lang="en-US" smtClean="0"/>
-              <a:t>1/3/24</a:t>
+              <a:t>3/18/24</a:t>
             </a:fld>
             <a:endParaRPr lang="en-US"/>
           </a:p>
@@ -1815,7 +1817,7 @@
           <a:p>
             <a:fld id="{0BABE5B4-7A23-8B46-A908-44B4384204E4}" type="datetimeFigureOut">
               <a:rPr lang="en-US" smtClean="0"/>
-              <a:t>1/3/24</a:t>
+              <a:t>3/18/24</a:t>
             </a:fld>
             <a:endParaRPr lang="en-US"/>
           </a:p>
@@ -1956,7 +1958,7 @@
           <a:p>
             <a:fld id="{0BABE5B4-7A23-8B46-A908-44B4384204E4}" type="datetimeFigureOut">
               <a:rPr lang="en-US" smtClean="0"/>
-              <a:t>1/3/24</a:t>
+              <a:t>3/18/24</a:t>
             </a:fld>
             <a:endParaRPr lang="en-US"/>
           </a:p>
@@ -2069,7 +2071,7 @@
           <a:p>
             <a:fld id="{0BABE5B4-7A23-8B46-A908-44B4384204E4}" type="datetimeFigureOut">
               <a:rPr lang="en-US" smtClean="0"/>
-              <a:t>1/3/24</a:t>
+              <a:t>3/18/24</a:t>
             </a:fld>
             <a:endParaRPr lang="en-US"/>
           </a:p>
@@ -2380,7 +2382,7 @@
           <a:p>
             <a:fld id="{0BABE5B4-7A23-8B46-A908-44B4384204E4}" type="datetimeFigureOut">
               <a:rPr lang="en-US" smtClean="0"/>
-              <a:t>1/3/24</a:t>
+              <a:t>3/18/24</a:t>
             </a:fld>
             <a:endParaRPr lang="en-US"/>
           </a:p>
@@ -2668,7 +2670,7 @@
           <a:p>
             <a:fld id="{0BABE5B4-7A23-8B46-A908-44B4384204E4}" type="datetimeFigureOut">
               <a:rPr lang="en-US" smtClean="0"/>
-              <a:t>1/3/24</a:t>
+              <a:t>3/18/24</a:t>
             </a:fld>
             <a:endParaRPr lang="en-US"/>
           </a:p>
@@ -2909,7 +2911,7 @@
           <a:p>
             <a:fld id="{0BABE5B4-7A23-8B46-A908-44B4384204E4}" type="datetimeFigureOut">
               <a:rPr lang="en-US" smtClean="0"/>
-              <a:t>1/3/24</a:t>
+              <a:t>3/18/24</a:t>
             </a:fld>
             <a:endParaRPr lang="en-US"/>
           </a:p>
@@ -3341,14 +3343,26 @@
           <p:nvPr/>
         </p:nvSpPr>
         <p:spPr>
-          <a:xfrm>
+          <a:xfrm rot="10800000">
             <a:off x="8873706" y="3929333"/>
             <a:ext cx="1371600" cy="1371600"/>
           </a:xfrm>
           <a:prstGeom prst="rect">
             <a:avLst/>
           </a:prstGeom>
-          <a:noFill/>
+          <a:blipFill dpi="0" rotWithShape="1">
+            <a:blip r:embed="rId2">
+              <a:extLst>
+                <a:ext uri="{28A0092B-C50C-407E-A947-70E740481C1C}">
+                  <a14:useLocalDpi xmlns:a14="http://schemas.microsoft.com/office/drawing/2010/main" val="0"/>
+                </a:ext>
+              </a:extLst>
+            </a:blip>
+            <a:srcRect/>
+            <a:stretch>
+              <a:fillRect/>
+            </a:stretch>
+          </a:blipFill>
           <a:ln w="19050">
             <a:solidFill>
               <a:schemeClr val="tx1"/>
@@ -3376,14 +3390,11 @@
           <a:lstStyle/>
           <a:p>
             <a:pPr algn="ctr"/>
-            <a:r>
-              <a:rPr lang="en-US" sz="3600" dirty="0">
-                <a:solidFill>
-                  <a:schemeClr val="tx1"/>
-                </a:solidFill>
-              </a:rPr>
-              <a:t>SCA18</a:t>
-            </a:r>
+            <a:endParaRPr lang="en-US" sz="3600" dirty="0">
+              <a:solidFill>
+                <a:schemeClr val="tx1"/>
+              </a:solidFill>
+            </a:endParaRPr>
           </a:p>
         </p:txBody>
       </p:sp>
@@ -3402,14 +3413,26 @@
           <p:nvPr/>
         </p:nvSpPr>
         <p:spPr>
-          <a:xfrm>
+          <a:xfrm rot="10800000">
             <a:off x="8873706" y="2494474"/>
             <a:ext cx="1371600" cy="1371600"/>
           </a:xfrm>
           <a:prstGeom prst="rect">
             <a:avLst/>
           </a:prstGeom>
-          <a:noFill/>
+          <a:blipFill dpi="0" rotWithShape="1">
+            <a:blip r:embed="rId3">
+              <a:extLst>
+                <a:ext uri="{28A0092B-C50C-407E-A947-70E740481C1C}">
+                  <a14:useLocalDpi xmlns:a14="http://schemas.microsoft.com/office/drawing/2010/main" val="0"/>
+                </a:ext>
+              </a:extLst>
+            </a:blip>
+            <a:srcRect/>
+            <a:stretch>
+              <a:fillRect/>
+            </a:stretch>
+          </a:blipFill>
           <a:ln w="19050">
             <a:solidFill>
               <a:schemeClr val="tx1"/>
@@ -3437,14 +3460,11 @@
           <a:lstStyle/>
           <a:p>
             <a:pPr algn="ctr"/>
-            <a:r>
-              <a:rPr lang="en-US" sz="3600" dirty="0">
-                <a:solidFill>
-                  <a:schemeClr val="tx1"/>
-                </a:solidFill>
-              </a:rPr>
-              <a:t>SCA17</a:t>
-            </a:r>
+            <a:endParaRPr lang="en-US" sz="3600" dirty="0">
+              <a:solidFill>
+                <a:schemeClr val="tx1"/>
+              </a:solidFill>
+            </a:endParaRPr>
           </a:p>
         </p:txBody>
       </p:sp>
@@ -3463,14 +3483,26 @@
           <p:nvPr/>
         </p:nvSpPr>
         <p:spPr>
-          <a:xfrm>
+          <a:xfrm rot="10800000">
             <a:off x="8873706" y="974787"/>
             <a:ext cx="1371600" cy="1371600"/>
           </a:xfrm>
           <a:prstGeom prst="rect">
             <a:avLst/>
           </a:prstGeom>
-          <a:noFill/>
+          <a:blipFill dpi="0" rotWithShape="1">
+            <a:blip r:embed="rId4">
+              <a:extLst>
+                <a:ext uri="{28A0092B-C50C-407E-A947-70E740481C1C}">
+                  <a14:useLocalDpi xmlns:a14="http://schemas.microsoft.com/office/drawing/2010/main" val="0"/>
+                </a:ext>
+              </a:extLst>
+            </a:blip>
+            <a:srcRect/>
+            <a:stretch>
+              <a:fillRect/>
+            </a:stretch>
+          </a:blipFill>
           <a:ln w="19050">
             <a:solidFill>
               <a:schemeClr val="tx1"/>
@@ -3498,14 +3530,11 @@
           <a:lstStyle/>
           <a:p>
             <a:pPr algn="ctr"/>
-            <a:r>
-              <a:rPr lang="en-US" sz="3600" dirty="0">
-                <a:solidFill>
-                  <a:schemeClr val="tx1"/>
-                </a:solidFill>
-              </a:rPr>
-              <a:t>SCA16</a:t>
-            </a:r>
+            <a:endParaRPr lang="en-US" sz="3600" dirty="0">
+              <a:solidFill>
+                <a:schemeClr val="tx1"/>
+              </a:solidFill>
+            </a:endParaRPr>
           </a:p>
         </p:txBody>
       </p:sp>
@@ -3524,14 +3553,26 @@
           <p:nvPr/>
         </p:nvSpPr>
         <p:spPr>
-          <a:xfrm>
+          <a:xfrm rot="10800000">
             <a:off x="1690777" y="3929333"/>
             <a:ext cx="1371600" cy="1371600"/>
           </a:xfrm>
           <a:prstGeom prst="rect">
             <a:avLst/>
           </a:prstGeom>
-          <a:noFill/>
+          <a:blipFill dpi="0" rotWithShape="1">
+            <a:blip r:embed="rId5">
+              <a:extLst>
+                <a:ext uri="{28A0092B-C50C-407E-A947-70E740481C1C}">
+                  <a14:useLocalDpi xmlns:a14="http://schemas.microsoft.com/office/drawing/2010/main" val="0"/>
+                </a:ext>
+              </a:extLst>
+            </a:blip>
+            <a:srcRect/>
+            <a:stretch>
+              <a:fillRect/>
+            </a:stretch>
+          </a:blipFill>
           <a:ln w="19050">
             <a:solidFill>
               <a:schemeClr val="tx1"/>
@@ -3559,14 +3600,11 @@
           <a:lstStyle/>
           <a:p>
             <a:pPr algn="ctr"/>
-            <a:r>
-              <a:rPr lang="en-US" sz="3600" dirty="0">
-                <a:solidFill>
-                  <a:schemeClr val="tx1"/>
-                </a:solidFill>
-              </a:rPr>
-              <a:t>SCA09</a:t>
-            </a:r>
+            <a:endParaRPr lang="en-US" sz="3600" dirty="0">
+              <a:solidFill>
+                <a:schemeClr val="tx1"/>
+              </a:solidFill>
+            </a:endParaRPr>
           </a:p>
         </p:txBody>
       </p:sp>
@@ -3585,14 +3623,26 @@
           <p:nvPr/>
         </p:nvSpPr>
         <p:spPr>
-          <a:xfrm>
+          <a:xfrm rot="10800000">
             <a:off x="1690777" y="2494474"/>
             <a:ext cx="1371600" cy="1371600"/>
           </a:xfrm>
           <a:prstGeom prst="rect">
             <a:avLst/>
           </a:prstGeom>
-          <a:noFill/>
+          <a:blipFill dpi="0" rotWithShape="1">
+            <a:blip r:embed="rId6">
+              <a:extLst>
+                <a:ext uri="{28A0092B-C50C-407E-A947-70E740481C1C}">
+                  <a14:useLocalDpi xmlns:a14="http://schemas.microsoft.com/office/drawing/2010/main" val="0"/>
+                </a:ext>
+              </a:extLst>
+            </a:blip>
+            <a:srcRect/>
+            <a:stretch>
+              <a:fillRect/>
+            </a:stretch>
+          </a:blipFill>
           <a:ln w="19050">
             <a:solidFill>
               <a:schemeClr val="tx1"/>
@@ -3620,14 +3670,11 @@
           <a:lstStyle/>
           <a:p>
             <a:pPr algn="ctr"/>
-            <a:r>
-              <a:rPr lang="en-US" sz="3600" dirty="0">
-                <a:solidFill>
-                  <a:schemeClr val="tx1"/>
-                </a:solidFill>
-              </a:rPr>
-              <a:t>SCA08</a:t>
-            </a:r>
+            <a:endParaRPr lang="en-US" sz="3600" dirty="0">
+              <a:solidFill>
+                <a:schemeClr val="tx1"/>
+              </a:solidFill>
+            </a:endParaRPr>
           </a:p>
         </p:txBody>
       </p:sp>
@@ -3646,14 +3693,26 @@
           <p:nvPr/>
         </p:nvSpPr>
         <p:spPr>
-          <a:xfrm>
+          <a:xfrm rot="10800000">
             <a:off x="1690777" y="974787"/>
             <a:ext cx="1371600" cy="1371600"/>
           </a:xfrm>
           <a:prstGeom prst="rect">
             <a:avLst/>
           </a:prstGeom>
-          <a:noFill/>
+          <a:blipFill dpi="0" rotWithShape="1">
+            <a:blip r:embed="rId7">
+              <a:extLst>
+                <a:ext uri="{28A0092B-C50C-407E-A947-70E740481C1C}">
+                  <a14:useLocalDpi xmlns:a14="http://schemas.microsoft.com/office/drawing/2010/main" val="0"/>
+                </a:ext>
+              </a:extLst>
+            </a:blip>
+            <a:srcRect/>
+            <a:stretch>
+              <a:fillRect/>
+            </a:stretch>
+          </a:blipFill>
           <a:ln w="19050">
             <a:solidFill>
               <a:schemeClr val="tx1"/>
@@ -3681,14 +3740,11 @@
           <a:lstStyle/>
           <a:p>
             <a:pPr algn="ctr"/>
-            <a:r>
-              <a:rPr lang="en-US" sz="3600" dirty="0">
-                <a:solidFill>
-                  <a:schemeClr val="tx1"/>
-                </a:solidFill>
-              </a:rPr>
-              <a:t>SCA07</a:t>
-            </a:r>
+            <a:endParaRPr lang="en-US" sz="3600" dirty="0">
+              <a:solidFill>
+                <a:schemeClr val="tx1"/>
+              </a:solidFill>
+            </a:endParaRPr>
           </a:p>
         </p:txBody>
       </p:sp>
@@ -3707,14 +3763,19 @@
           <p:nvPr/>
         </p:nvSpPr>
         <p:spPr>
-          <a:xfrm>
+          <a:xfrm rot="10800000">
             <a:off x="7438845" y="4615133"/>
             <a:ext cx="1371600" cy="1371600"/>
           </a:xfrm>
           <a:prstGeom prst="rect">
             <a:avLst/>
           </a:prstGeom>
-          <a:noFill/>
+          <a:blipFill>
+            <a:blip r:embed="rId8"/>
+            <a:stretch>
+              <a:fillRect/>
+            </a:stretch>
+          </a:blipFill>
           <a:ln w="19050">
             <a:solidFill>
               <a:schemeClr val="tx1"/>
@@ -3742,14 +3803,11 @@
           <a:lstStyle/>
           <a:p>
             <a:pPr algn="ctr"/>
-            <a:r>
-              <a:rPr lang="en-US" sz="3600" dirty="0">
-                <a:solidFill>
-                  <a:schemeClr val="tx1"/>
-                </a:solidFill>
-              </a:rPr>
-              <a:t>SCA15</a:t>
-            </a:r>
+            <a:endParaRPr lang="en-US" sz="3600" dirty="0">
+              <a:solidFill>
+                <a:schemeClr val="tx1"/>
+              </a:solidFill>
+            </a:endParaRPr>
           </a:p>
         </p:txBody>
       </p:sp>
@@ -3768,14 +3826,26 @@
           <p:nvPr/>
         </p:nvSpPr>
         <p:spPr>
-          <a:xfrm>
+          <a:xfrm rot="10800000">
             <a:off x="7438845" y="3180274"/>
             <a:ext cx="1371600" cy="1371600"/>
           </a:xfrm>
           <a:prstGeom prst="rect">
             <a:avLst/>
           </a:prstGeom>
-          <a:noFill/>
+          <a:blipFill dpi="0" rotWithShape="1">
+            <a:blip r:embed="rId9">
+              <a:extLst>
+                <a:ext uri="{28A0092B-C50C-407E-A947-70E740481C1C}">
+                  <a14:useLocalDpi xmlns:a14="http://schemas.microsoft.com/office/drawing/2010/main" val="0"/>
+                </a:ext>
+              </a:extLst>
+            </a:blip>
+            <a:srcRect/>
+            <a:stretch>
+              <a:fillRect/>
+            </a:stretch>
+          </a:blipFill>
           <a:ln w="19050">
             <a:solidFill>
               <a:schemeClr val="tx1"/>
@@ -3803,14 +3873,11 @@
           <a:lstStyle/>
           <a:p>
             <a:pPr algn="ctr"/>
-            <a:r>
-              <a:rPr lang="en-US" sz="3600" dirty="0">
-                <a:solidFill>
-                  <a:schemeClr val="tx1"/>
-                </a:solidFill>
-              </a:rPr>
-              <a:t>SCA14</a:t>
-            </a:r>
+            <a:endParaRPr lang="en-US" sz="3600" dirty="0">
+              <a:solidFill>
+                <a:schemeClr val="tx1"/>
+              </a:solidFill>
+            </a:endParaRPr>
           </a:p>
         </p:txBody>
       </p:sp>
@@ -3829,14 +3896,26 @@
           <p:nvPr/>
         </p:nvSpPr>
         <p:spPr>
-          <a:xfrm>
+          <a:xfrm rot="10800000">
             <a:off x="7438845" y="1660587"/>
             <a:ext cx="1371600" cy="1371600"/>
           </a:xfrm>
           <a:prstGeom prst="rect">
             <a:avLst/>
           </a:prstGeom>
-          <a:noFill/>
+          <a:blipFill dpi="0" rotWithShape="1">
+            <a:blip r:embed="rId10">
+              <a:extLst>
+                <a:ext uri="{28A0092B-C50C-407E-A947-70E740481C1C}">
+                  <a14:useLocalDpi xmlns:a14="http://schemas.microsoft.com/office/drawing/2010/main" val="0"/>
+                </a:ext>
+              </a:extLst>
+            </a:blip>
+            <a:srcRect/>
+            <a:stretch>
+              <a:fillRect/>
+            </a:stretch>
+          </a:blipFill>
           <a:ln w="19050">
             <a:solidFill>
               <a:schemeClr val="tx1"/>
@@ -3864,14 +3943,11 @@
           <a:lstStyle/>
           <a:p>
             <a:pPr algn="ctr"/>
-            <a:r>
-              <a:rPr lang="en-US" sz="3600" dirty="0">
-                <a:solidFill>
-                  <a:schemeClr val="tx1"/>
-                </a:solidFill>
-              </a:rPr>
-              <a:t>SCA13</a:t>
-            </a:r>
+            <a:endParaRPr lang="en-US" sz="3600" dirty="0">
+              <a:solidFill>
+                <a:schemeClr val="tx1"/>
+              </a:solidFill>
+            </a:endParaRPr>
           </a:p>
         </p:txBody>
       </p:sp>
@@ -3890,14 +3966,26 @@
           <p:nvPr/>
         </p:nvSpPr>
         <p:spPr>
-          <a:xfrm>
+          <a:xfrm rot="10800000">
             <a:off x="3129950" y="4615133"/>
             <a:ext cx="1371600" cy="1371600"/>
           </a:xfrm>
           <a:prstGeom prst="rect">
             <a:avLst/>
           </a:prstGeom>
-          <a:noFill/>
+          <a:blipFill dpi="0" rotWithShape="1">
+            <a:blip r:embed="rId11">
+              <a:extLst>
+                <a:ext uri="{28A0092B-C50C-407E-A947-70E740481C1C}">
+                  <a14:useLocalDpi xmlns:a14="http://schemas.microsoft.com/office/drawing/2010/main" val="0"/>
+                </a:ext>
+              </a:extLst>
+            </a:blip>
+            <a:srcRect/>
+            <a:stretch>
+              <a:fillRect/>
+            </a:stretch>
+          </a:blipFill>
           <a:ln w="19050">
             <a:solidFill>
               <a:schemeClr val="tx1"/>
@@ -3925,14 +4013,11 @@
           <a:lstStyle/>
           <a:p>
             <a:pPr algn="ctr"/>
-            <a:r>
-              <a:rPr lang="en-US" sz="3600" dirty="0">
-                <a:solidFill>
-                  <a:schemeClr val="tx1"/>
-                </a:solidFill>
-              </a:rPr>
-              <a:t>SCA06</a:t>
-            </a:r>
+            <a:endParaRPr lang="en-US" sz="3600" dirty="0">
+              <a:solidFill>
+                <a:schemeClr val="tx1"/>
+              </a:solidFill>
+            </a:endParaRPr>
           </a:p>
         </p:txBody>
       </p:sp>
@@ -3951,14 +4036,26 @@
           <p:nvPr/>
         </p:nvSpPr>
         <p:spPr>
-          <a:xfrm>
+          <a:xfrm rot="10800000">
             <a:off x="3129950" y="3180274"/>
             <a:ext cx="1371600" cy="1371600"/>
           </a:xfrm>
           <a:prstGeom prst="rect">
             <a:avLst/>
           </a:prstGeom>
-          <a:noFill/>
+          <a:blipFill dpi="0" rotWithShape="1">
+            <a:blip r:embed="rId12">
+              <a:extLst>
+                <a:ext uri="{28A0092B-C50C-407E-A947-70E740481C1C}">
+                  <a14:useLocalDpi xmlns:a14="http://schemas.microsoft.com/office/drawing/2010/main" val="0"/>
+                </a:ext>
+              </a:extLst>
+            </a:blip>
+            <a:srcRect/>
+            <a:stretch>
+              <a:fillRect/>
+            </a:stretch>
+          </a:blipFill>
           <a:ln w="19050">
             <a:solidFill>
               <a:schemeClr val="tx1"/>
@@ -3986,14 +4083,11 @@
           <a:lstStyle/>
           <a:p>
             <a:pPr algn="ctr"/>
-            <a:r>
-              <a:rPr lang="en-US" sz="3600" dirty="0">
-                <a:solidFill>
-                  <a:schemeClr val="tx1"/>
-                </a:solidFill>
-              </a:rPr>
-              <a:t>SCA05</a:t>
-            </a:r>
+            <a:endParaRPr lang="en-US" sz="3600" dirty="0">
+              <a:solidFill>
+                <a:schemeClr val="tx1"/>
+              </a:solidFill>
+            </a:endParaRPr>
           </a:p>
         </p:txBody>
       </p:sp>
@@ -4012,14 +4106,26 @@
           <p:nvPr/>
         </p:nvSpPr>
         <p:spPr>
-          <a:xfrm>
+          <a:xfrm rot="10800000">
             <a:off x="3129950" y="1660587"/>
             <a:ext cx="1371600" cy="1371600"/>
           </a:xfrm>
           <a:prstGeom prst="rect">
             <a:avLst/>
           </a:prstGeom>
-          <a:noFill/>
+          <a:blipFill dpi="0" rotWithShape="1">
+            <a:blip r:embed="rId13">
+              <a:extLst>
+                <a:ext uri="{28A0092B-C50C-407E-A947-70E740481C1C}">
+                  <a14:useLocalDpi xmlns:a14="http://schemas.microsoft.com/office/drawing/2010/main" val="0"/>
+                </a:ext>
+              </a:extLst>
+            </a:blip>
+            <a:srcRect/>
+            <a:stretch>
+              <a:fillRect/>
+            </a:stretch>
+          </a:blipFill>
           <a:ln w="19050">
             <a:solidFill>
               <a:schemeClr val="tx1"/>
@@ -4047,14 +4153,11 @@
           <a:lstStyle/>
           <a:p>
             <a:pPr algn="ctr"/>
-            <a:r>
-              <a:rPr lang="en-US" sz="3600" dirty="0">
-                <a:solidFill>
-                  <a:schemeClr val="tx1"/>
-                </a:solidFill>
-              </a:rPr>
-              <a:t>SCA04</a:t>
-            </a:r>
+            <a:endParaRPr lang="en-US" sz="3600" dirty="0">
+              <a:solidFill>
+                <a:schemeClr val="tx1"/>
+              </a:solidFill>
+            </a:endParaRPr>
           </a:p>
         </p:txBody>
       </p:sp>
@@ -4073,14 +4176,26 @@
           <p:nvPr/>
         </p:nvSpPr>
         <p:spPr>
-          <a:xfrm>
-            <a:off x="4564811" y="4848046"/>
+          <a:xfrm rot="10800000">
+            <a:off x="4566967" y="4908431"/>
             <a:ext cx="1371600" cy="1371600"/>
           </a:xfrm>
           <a:prstGeom prst="rect">
             <a:avLst/>
           </a:prstGeom>
-          <a:noFill/>
+          <a:blipFill dpi="0" rotWithShape="1">
+            <a:blip r:embed="rId14">
+              <a:extLst>
+                <a:ext uri="{28A0092B-C50C-407E-A947-70E740481C1C}">
+                  <a14:useLocalDpi xmlns:a14="http://schemas.microsoft.com/office/drawing/2010/main" val="0"/>
+                </a:ext>
+              </a:extLst>
+            </a:blip>
+            <a:srcRect/>
+            <a:stretch>
+              <a:fillRect/>
+            </a:stretch>
+          </a:blipFill>
           <a:ln w="19050">
             <a:solidFill>
               <a:schemeClr val="tx1"/>
@@ -4108,14 +4223,11 @@
           <a:lstStyle/>
           <a:p>
             <a:pPr algn="ctr"/>
-            <a:r>
-              <a:rPr lang="en-US" sz="3600" dirty="0">
-                <a:solidFill>
-                  <a:schemeClr val="tx1"/>
-                </a:solidFill>
-              </a:rPr>
-              <a:t>SCA03</a:t>
-            </a:r>
+            <a:endParaRPr lang="en-US" sz="3600" dirty="0">
+              <a:solidFill>
+                <a:schemeClr val="tx1"/>
+              </a:solidFill>
+            </a:endParaRPr>
           </a:p>
         </p:txBody>
       </p:sp>
@@ -4134,14 +4246,26 @@
           <p:nvPr/>
         </p:nvSpPr>
         <p:spPr>
-          <a:xfrm>
-            <a:off x="4564811" y="3413187"/>
+          <a:xfrm rot="10800000">
+            <a:off x="4566967" y="3473572"/>
             <a:ext cx="1371600" cy="1371600"/>
           </a:xfrm>
           <a:prstGeom prst="rect">
             <a:avLst/>
           </a:prstGeom>
-          <a:noFill/>
+          <a:blipFill dpi="0" rotWithShape="1">
+            <a:blip r:embed="rId15">
+              <a:extLst>
+                <a:ext uri="{28A0092B-C50C-407E-A947-70E740481C1C}">
+                  <a14:useLocalDpi xmlns:a14="http://schemas.microsoft.com/office/drawing/2010/main" val="0"/>
+                </a:ext>
+              </a:extLst>
+            </a:blip>
+            <a:srcRect/>
+            <a:stretch>
+              <a:fillRect/>
+            </a:stretch>
+          </a:blipFill>
           <a:ln w="19050">
             <a:solidFill>
               <a:schemeClr val="tx1"/>
@@ -4169,14 +4293,11 @@
           <a:lstStyle/>
           <a:p>
             <a:pPr algn="ctr"/>
-            <a:r>
-              <a:rPr lang="en-US" sz="3600" dirty="0">
-                <a:solidFill>
-                  <a:schemeClr val="tx1"/>
-                </a:solidFill>
-              </a:rPr>
-              <a:t>SCA02</a:t>
-            </a:r>
+            <a:endParaRPr lang="en-US" sz="3600" dirty="0">
+              <a:solidFill>
+                <a:schemeClr val="tx1"/>
+              </a:solidFill>
+            </a:endParaRPr>
           </a:p>
         </p:txBody>
       </p:sp>
@@ -4195,14 +4316,26 @@
           <p:nvPr/>
         </p:nvSpPr>
         <p:spPr>
-          <a:xfrm>
-            <a:off x="4564811" y="1893500"/>
+          <a:xfrm rot="10800000">
+            <a:off x="4566967" y="1953885"/>
             <a:ext cx="1371600" cy="1371600"/>
           </a:xfrm>
           <a:prstGeom prst="rect">
             <a:avLst/>
           </a:prstGeom>
-          <a:noFill/>
+          <a:blipFill dpi="0" rotWithShape="1">
+            <a:blip r:embed="rId16">
+              <a:extLst>
+                <a:ext uri="{28A0092B-C50C-407E-A947-70E740481C1C}">
+                  <a14:useLocalDpi xmlns:a14="http://schemas.microsoft.com/office/drawing/2010/main" val="0"/>
+                </a:ext>
+              </a:extLst>
+            </a:blip>
+            <a:srcRect/>
+            <a:stretch>
+              <a:fillRect/>
+            </a:stretch>
+          </a:blipFill>
           <a:ln w="19050">
             <a:solidFill>
               <a:schemeClr val="tx1"/>
@@ -4230,14 +4363,11 @@
           <a:lstStyle/>
           <a:p>
             <a:pPr algn="ctr"/>
-            <a:r>
-              <a:rPr lang="en-US" sz="3600" dirty="0">
-                <a:solidFill>
-                  <a:schemeClr val="tx1"/>
-                </a:solidFill>
-              </a:rPr>
-              <a:t>SCA01</a:t>
-            </a:r>
+            <a:endParaRPr lang="en-US" sz="3600" dirty="0">
+              <a:solidFill>
+                <a:schemeClr val="tx1"/>
+              </a:solidFill>
+            </a:endParaRPr>
           </a:p>
         </p:txBody>
       </p:sp>
@@ -4257,13 +4387,18 @@
         </p:nvSpPr>
         <p:spPr>
           <a:xfrm>
-            <a:off x="6001828" y="4848046"/>
+            <a:off x="6003984" y="4908431"/>
             <a:ext cx="1371600" cy="1371600"/>
           </a:xfrm>
           <a:prstGeom prst="rect">
             <a:avLst/>
           </a:prstGeom>
-          <a:noFill/>
+          <a:blipFill>
+            <a:blip r:embed="rId17"/>
+            <a:stretch>
+              <a:fillRect/>
+            </a:stretch>
+          </a:blipFill>
           <a:ln w="19050">
             <a:solidFill>
               <a:schemeClr val="tx1"/>
@@ -4291,14 +4426,11 @@
           <a:lstStyle/>
           <a:p>
             <a:pPr algn="ctr"/>
-            <a:r>
-              <a:rPr lang="en-US" sz="3600" dirty="0">
-                <a:solidFill>
-                  <a:schemeClr val="tx1"/>
-                </a:solidFill>
-              </a:rPr>
-              <a:t>SCA12</a:t>
-            </a:r>
+            <a:endParaRPr lang="en-US" sz="3600" dirty="0">
+              <a:solidFill>
+                <a:schemeClr val="tx1"/>
+              </a:solidFill>
+            </a:endParaRPr>
           </a:p>
         </p:txBody>
       </p:sp>
@@ -4317,14 +4449,26 @@
           <p:nvPr/>
         </p:nvSpPr>
         <p:spPr>
-          <a:xfrm>
-            <a:off x="6001828" y="3413187"/>
+          <a:xfrm rot="10800000">
+            <a:off x="6003984" y="3473572"/>
             <a:ext cx="1371600" cy="1371600"/>
           </a:xfrm>
           <a:prstGeom prst="rect">
             <a:avLst/>
           </a:prstGeom>
-          <a:noFill/>
+          <a:blipFill dpi="0" rotWithShape="1">
+            <a:blip r:embed="rId18">
+              <a:extLst>
+                <a:ext uri="{28A0092B-C50C-407E-A947-70E740481C1C}">
+                  <a14:useLocalDpi xmlns:a14="http://schemas.microsoft.com/office/drawing/2010/main" val="0"/>
+                </a:ext>
+              </a:extLst>
+            </a:blip>
+            <a:srcRect/>
+            <a:stretch>
+              <a:fillRect/>
+            </a:stretch>
+          </a:blipFill>
           <a:ln w="19050">
             <a:solidFill>
               <a:schemeClr val="tx1"/>
@@ -4352,14 +4496,11 @@
           <a:lstStyle/>
           <a:p>
             <a:pPr algn="ctr"/>
-            <a:r>
-              <a:rPr lang="en-US" sz="3600" dirty="0">
-                <a:solidFill>
-                  <a:schemeClr val="tx1"/>
-                </a:solidFill>
-              </a:rPr>
-              <a:t>SCA11</a:t>
-            </a:r>
+            <a:endParaRPr lang="en-US" sz="3600" dirty="0">
+              <a:solidFill>
+                <a:schemeClr val="tx1"/>
+              </a:solidFill>
+            </a:endParaRPr>
           </a:p>
         </p:txBody>
       </p:sp>
@@ -4378,14 +4519,26 @@
           <p:nvPr/>
         </p:nvSpPr>
         <p:spPr>
-          <a:xfrm>
-            <a:off x="6001828" y="1893500"/>
+          <a:xfrm rot="10800000">
+            <a:off x="6003984" y="1953885"/>
             <a:ext cx="1371600" cy="1371600"/>
           </a:xfrm>
           <a:prstGeom prst="rect">
             <a:avLst/>
           </a:prstGeom>
-          <a:noFill/>
+          <a:blipFill dpi="0" rotWithShape="1">
+            <a:blip r:embed="rId19">
+              <a:extLst>
+                <a:ext uri="{28A0092B-C50C-407E-A947-70E740481C1C}">
+                  <a14:useLocalDpi xmlns:a14="http://schemas.microsoft.com/office/drawing/2010/main" val="0"/>
+                </a:ext>
+              </a:extLst>
+            </a:blip>
+            <a:srcRect/>
+            <a:stretch>
+              <a:fillRect/>
+            </a:stretch>
+          </a:blipFill>
           <a:ln w="19050">
             <a:solidFill>
               <a:schemeClr val="tx1"/>
@@ -4413,14 +4566,11 @@
           <a:lstStyle/>
           <a:p>
             <a:pPr algn="ctr"/>
-            <a:r>
-              <a:rPr lang="en-US" sz="3600" dirty="0">
-                <a:solidFill>
-                  <a:schemeClr val="tx1"/>
-                </a:solidFill>
-              </a:rPr>
-              <a:t>SCA10</a:t>
-            </a:r>
+            <a:endParaRPr lang="en-US" sz="3600" dirty="0">
+              <a:solidFill>
+                <a:schemeClr val="tx1"/>
+              </a:solidFill>
+            </a:endParaRPr>
           </a:p>
         </p:txBody>
       </p:sp>
@@ -4428,6 +4578,125 @@
     <p:extLst>
       <p:ext uri="{BB962C8B-B14F-4D97-AF65-F5344CB8AC3E}">
         <p14:creationId xmlns:p14="http://schemas.microsoft.com/office/powerpoint/2010/main" val="2119734342"/>
+      </p:ext>
+    </p:extLst>
+  </p:cSld>
+  <p:clrMapOvr>
+    <a:masterClrMapping/>
+  </p:clrMapOvr>
+</p:sld>
+</file>
+
+<file path=ppt/slides/slide2.xml><?xml version="1.0" encoding="utf-8"?>
+<p:sld xmlns:a="http://schemas.openxmlformats.org/drawingml/2006/main" xmlns:r="http://schemas.openxmlformats.org/officeDocument/2006/relationships" xmlns:p="http://schemas.openxmlformats.org/presentationml/2006/main">
+  <p:cSld>
+    <p:spTree>
+      <p:nvGrpSpPr>
+        <p:cNvPr id="1" name=""/>
+        <p:cNvGrpSpPr/>
+        <p:nvPr/>
+      </p:nvGrpSpPr>
+      <p:grpSpPr>
+        <a:xfrm>
+          <a:off x="0" y="0"/>
+          <a:ext cx="0" cy="0"/>
+          <a:chOff x="0" y="0"/>
+          <a:chExt cx="0" cy="0"/>
+        </a:xfrm>
+      </p:grpSpPr>
+      <p:pic>
+        <p:nvPicPr>
+          <p:cNvPr id="2" name="Picture 1">
+            <a:extLst>
+              <a:ext uri="{FF2B5EF4-FFF2-40B4-BE49-F238E27FC236}">
+                <a16:creationId xmlns:a16="http://schemas.microsoft.com/office/drawing/2014/main" id="{3A544872-F994-069E-5F6E-122AEE160CA9}"/>
+              </a:ext>
+            </a:extLst>
+          </p:cNvPr>
+          <p:cNvPicPr>
+            <a:picLocks noChangeAspect="1"/>
+          </p:cNvPicPr>
+          <p:nvPr/>
+        </p:nvPicPr>
+        <p:blipFill>
+          <a:blip r:embed="rId2"/>
+          <a:stretch>
+            <a:fillRect/>
+          </a:stretch>
+        </p:blipFill>
+        <p:spPr>
+          <a:xfrm>
+            <a:off x="525517" y="4619"/>
+            <a:ext cx="11140966" cy="6853381"/>
+          </a:xfrm>
+          <a:prstGeom prst="rect">
+            <a:avLst/>
+          </a:prstGeom>
+        </p:spPr>
+      </p:pic>
+    </p:spTree>
+    <p:extLst>
+      <p:ext uri="{BB962C8B-B14F-4D97-AF65-F5344CB8AC3E}">
+        <p14:creationId xmlns:p14="http://schemas.microsoft.com/office/powerpoint/2010/main" val="3364409871"/>
+      </p:ext>
+    </p:extLst>
+  </p:cSld>
+  <p:clrMapOvr>
+    <a:masterClrMapping/>
+  </p:clrMapOvr>
+</p:sld>
+</file>
+
+<file path=ppt/slides/slide3.xml><?xml version="1.0" encoding="utf-8"?>
+<p:sld xmlns:a="http://schemas.openxmlformats.org/drawingml/2006/main" xmlns:r="http://schemas.openxmlformats.org/officeDocument/2006/relationships" xmlns:p="http://schemas.openxmlformats.org/presentationml/2006/main">
+  <p:cSld>
+    <p:spTree>
+      <p:nvGrpSpPr>
+        <p:cNvPr id="1" name=""/>
+        <p:cNvGrpSpPr/>
+        <p:nvPr/>
+      </p:nvGrpSpPr>
+      <p:grpSpPr>
+        <a:xfrm>
+          <a:off x="0" y="0"/>
+          <a:ext cx="0" cy="0"/>
+          <a:chOff x="0" y="0"/>
+          <a:chExt cx="0" cy="0"/>
+        </a:xfrm>
+      </p:grpSpPr>
+      <p:pic>
+        <p:nvPicPr>
+          <p:cNvPr id="2" name="Picture 1">
+            <a:extLst>
+              <a:ext uri="{FF2B5EF4-FFF2-40B4-BE49-F238E27FC236}">
+                <a16:creationId xmlns:a16="http://schemas.microsoft.com/office/drawing/2014/main" id="{3A544872-F994-069E-5F6E-122AEE160CA9}"/>
+              </a:ext>
+            </a:extLst>
+          </p:cNvPr>
+          <p:cNvPicPr>
+            <a:picLocks noChangeAspect="1"/>
+          </p:cNvPicPr>
+          <p:nvPr/>
+        </p:nvPicPr>
+        <p:blipFill rotWithShape="1">
+          <a:blip r:embed="rId2"/>
+          <a:srcRect l="81382" t="45242" r="4610" b="31607"/>
+          <a:stretch/>
+        </p:blipFill>
+        <p:spPr>
+          <a:xfrm>
+            <a:off x="1026543" y="1440611"/>
+            <a:ext cx="1552755" cy="1578635"/>
+          </a:xfrm>
+          <a:prstGeom prst="rect">
+            <a:avLst/>
+          </a:prstGeom>
+        </p:spPr>
+      </p:pic>
+    </p:spTree>
+    <p:extLst>
+      <p:ext uri="{BB962C8B-B14F-4D97-AF65-F5344CB8AC3E}">
+        <p14:creationId xmlns:p14="http://schemas.microsoft.com/office/powerpoint/2010/main" val="2791158311"/>
       </p:ext>
     </p:extLst>
   </p:cSld>

</xml_diff>